<commit_message>
Added missing thumbnails for galleries (#1982)
Co-authored-by: Ryan Ly <rly@lbl.gov>
</commit_message>
<xml_diff>
--- a/docs/source/figures/gallery_thumbnails.pptx
+++ b/docs/source/figures/gallery_thumbnails.pptx
@@ -5,7 +5,7 @@
     <p:sldMasterId id="2147483660" r:id="rId1"/>
   </p:sldMasterIdLst>
   <p:notesMasterIdLst>
-    <p:notesMasterId r:id="rId20"/>
+    <p:notesMasterId r:id="rId22"/>
   </p:notesMasterIdLst>
   <p:sldIdLst>
     <p:sldId id="342" r:id="rId2"/>
@@ -26,6 +26,8 @@
     <p:sldId id="355" r:id="rId17"/>
     <p:sldId id="358" r:id="rId18"/>
     <p:sldId id="359" r:id="rId19"/>
+    <p:sldId id="366" r:id="rId20"/>
+    <p:sldId id="367" r:id="rId21"/>
   </p:sldIdLst>
   <p:sldSz cx="12192000" cy="6858000"/>
   <p:notesSz cx="6858000" cy="9144000"/>
@@ -127,7 +129,7 @@
   <p:extLst>
     <p:ext uri="{EFAFB233-063F-42B5-8137-9DF3F51BA10A}">
       <p15:sldGuideLst xmlns:p15="http://schemas.microsoft.com/office/powerpoint/2012/main">
-        <p15:guide id="1" orient="horz" pos="3405">
+        <p15:guide id="1" orient="horz" pos="3384" userDrawn="1">
           <p15:clr>
             <a:srgbClr val="A4A3A4"/>
           </p15:clr>
@@ -225,7 +227,7 @@
           <a:p>
             <a:fld id="{4D6A40B9-902A-4E0E-AF39-1C357549AEE0}" type="datetimeFigureOut">
               <a:rPr lang="en-US" smtClean="0"/>
-              <a:t>7/19/23</a:t>
+              <a:t>11/7/24</a:t>
             </a:fld>
             <a:endParaRPr lang="en-US"/>
           </a:p>
@@ -3981,6 +3983,13 @@
             <a:schemeClr val="lt1"/>
           </a:fontRef>
         </p:style>
+        <p:txBody>
+          <a:bodyPr/>
+          <a:lstStyle/>
+          <a:p>
+            <a:endParaRPr lang="en-US"/>
+          </a:p>
+        </p:txBody>
       </p:sp>
       <p:sp>
         <p:nvSpPr>
@@ -4040,6 +4049,13 @@
             <a:schemeClr val="lt1"/>
           </a:fontRef>
         </p:style>
+        <p:txBody>
+          <a:bodyPr/>
+          <a:lstStyle/>
+          <a:p>
+            <a:endParaRPr lang="en-US"/>
+          </a:p>
+        </p:txBody>
       </p:sp>
       <p:sp>
         <p:nvSpPr>
@@ -4197,6 +4213,13 @@
             <a:schemeClr val="lt1"/>
           </a:fontRef>
         </p:style>
+        <p:txBody>
+          <a:bodyPr/>
+          <a:lstStyle/>
+          <a:p>
+            <a:endParaRPr lang="en-US"/>
+          </a:p>
+        </p:txBody>
       </p:sp>
       <p:sp>
         <p:nvSpPr>
@@ -5053,6 +5076,13 @@
             <a:schemeClr val="lt1"/>
           </a:fontRef>
         </p:style>
+        <p:txBody>
+          <a:bodyPr/>
+          <a:lstStyle/>
+          <a:p>
+            <a:endParaRPr lang="en-US"/>
+          </a:p>
+        </p:txBody>
       </p:sp>
       <p:sp>
         <p:nvSpPr>
@@ -5112,6 +5142,13 @@
             <a:schemeClr val="lt1"/>
           </a:fontRef>
         </p:style>
+        <p:txBody>
+          <a:bodyPr/>
+          <a:lstStyle/>
+          <a:p>
+            <a:endParaRPr lang="en-US"/>
+          </a:p>
+        </p:txBody>
       </p:sp>
       <p:sp>
         <p:nvSpPr>
@@ -5171,6 +5208,13 @@
             <a:schemeClr val="lt1"/>
           </a:fontRef>
         </p:style>
+        <p:txBody>
+          <a:bodyPr/>
+          <a:lstStyle/>
+          <a:p>
+            <a:endParaRPr lang="en-US"/>
+          </a:p>
+        </p:txBody>
       </p:sp>
       <p:sp>
         <p:nvSpPr>
@@ -5230,6 +5274,13 @@
             <a:schemeClr val="lt1"/>
           </a:fontRef>
         </p:style>
+        <p:txBody>
+          <a:bodyPr/>
+          <a:lstStyle/>
+          <a:p>
+            <a:endParaRPr lang="en-US"/>
+          </a:p>
+        </p:txBody>
       </p:sp>
       <p:sp>
         <p:nvSpPr>
@@ -5289,6 +5340,13 @@
             <a:schemeClr val="lt1"/>
           </a:fontRef>
         </p:style>
+        <p:txBody>
+          <a:bodyPr/>
+          <a:lstStyle/>
+          <a:p>
+            <a:endParaRPr lang="en-US"/>
+          </a:p>
+        </p:txBody>
       </p:sp>
       <p:sp>
         <p:nvSpPr>
@@ -5434,6 +5492,13 @@
             <a:schemeClr val="lt1"/>
           </a:fontRef>
         </p:style>
+        <p:txBody>
+          <a:bodyPr/>
+          <a:lstStyle/>
+          <a:p>
+            <a:endParaRPr lang="en-US"/>
+          </a:p>
+        </p:txBody>
       </p:sp>
       <p:sp>
         <p:nvSpPr>
@@ -5579,6 +5644,13 @@
             <a:schemeClr val="lt1"/>
           </a:fontRef>
         </p:style>
+        <p:txBody>
+          <a:bodyPr/>
+          <a:lstStyle/>
+          <a:p>
+            <a:endParaRPr lang="en-US"/>
+          </a:p>
+        </p:txBody>
       </p:sp>
       <p:sp>
         <p:nvSpPr>
@@ -5724,6 +5796,13 @@
             <a:schemeClr val="lt1"/>
           </a:fontRef>
         </p:style>
+        <p:txBody>
+          <a:bodyPr/>
+          <a:lstStyle/>
+          <a:p>
+            <a:endParaRPr lang="en-US"/>
+          </a:p>
+        </p:txBody>
       </p:sp>
       <p:sp>
         <p:nvSpPr>
@@ -6910,6 +6989,13 @@
             <a:schemeClr val="lt1"/>
           </a:fontRef>
         </p:style>
+        <p:txBody>
+          <a:bodyPr/>
+          <a:lstStyle/>
+          <a:p>
+            <a:endParaRPr lang="en-US"/>
+          </a:p>
+        </p:txBody>
       </p:sp>
       <p:sp>
         <p:nvSpPr>
@@ -6969,6 +7055,13 @@
             <a:schemeClr val="lt1"/>
           </a:fontRef>
         </p:style>
+        <p:txBody>
+          <a:bodyPr/>
+          <a:lstStyle/>
+          <a:p>
+            <a:endParaRPr lang="en-US"/>
+          </a:p>
+        </p:txBody>
       </p:sp>
       <p:sp>
         <p:nvSpPr>
@@ -7028,6 +7121,13 @@
             <a:schemeClr val="lt1"/>
           </a:fontRef>
         </p:style>
+        <p:txBody>
+          <a:bodyPr/>
+          <a:lstStyle/>
+          <a:p>
+            <a:endParaRPr lang="en-US"/>
+          </a:p>
+        </p:txBody>
       </p:sp>
       <p:sp>
         <p:nvSpPr>
@@ -7087,6 +7187,13 @@
             <a:schemeClr val="lt1"/>
           </a:fontRef>
         </p:style>
+        <p:txBody>
+          <a:bodyPr/>
+          <a:lstStyle/>
+          <a:p>
+            <a:endParaRPr lang="en-US"/>
+          </a:p>
+        </p:txBody>
       </p:sp>
       <p:sp>
         <p:nvSpPr>
@@ -7144,6 +7251,13 @@
             <a:schemeClr val="lt1"/>
           </a:fontRef>
         </p:style>
+        <p:txBody>
+          <a:bodyPr/>
+          <a:lstStyle/>
+          <a:p>
+            <a:endParaRPr lang="en-US"/>
+          </a:p>
+        </p:txBody>
       </p:sp>
       <p:sp>
         <p:nvSpPr>
@@ -7407,6 +7521,13 @@
             <a:schemeClr val="lt1"/>
           </a:fontRef>
         </p:style>
+        <p:txBody>
+          <a:bodyPr/>
+          <a:lstStyle/>
+          <a:p>
+            <a:endParaRPr lang="en-US"/>
+          </a:p>
+        </p:txBody>
       </p:sp>
       <p:sp>
         <p:nvSpPr>
@@ -7464,6 +7585,13 @@
             <a:schemeClr val="lt1"/>
           </a:fontRef>
         </p:style>
+        <p:txBody>
+          <a:bodyPr/>
+          <a:lstStyle/>
+          <a:p>
+            <a:endParaRPr lang="en-US"/>
+          </a:p>
+        </p:txBody>
       </p:sp>
       <p:sp>
         <p:nvSpPr>
@@ -7605,6 +7733,13 @@
             <a:schemeClr val="lt1"/>
           </a:fontRef>
         </p:style>
+        <p:txBody>
+          <a:bodyPr/>
+          <a:lstStyle/>
+          <a:p>
+            <a:endParaRPr lang="en-US"/>
+          </a:p>
+        </p:txBody>
       </p:sp>
     </p:spTree>
     <p:extLst>
@@ -8621,6 +8756,343 @@
 </p:sld>
 </file>
 
+<file path=ppt/slides/slide19.xml><?xml version="1.0" encoding="utf-8"?>
+<p:sld xmlns:a="http://schemas.openxmlformats.org/drawingml/2006/main" xmlns:r="http://schemas.openxmlformats.org/officeDocument/2006/relationships" xmlns:p="http://schemas.openxmlformats.org/presentationml/2006/main">
+  <p:cSld>
+    <p:spTree>
+      <p:nvGrpSpPr>
+        <p:cNvPr id="1" name="">
+          <a:extLst>
+            <a:ext uri="{FF2B5EF4-FFF2-40B4-BE49-F238E27FC236}">
+              <a16:creationId xmlns:a16="http://schemas.microsoft.com/office/drawing/2014/main" id="{A1480663-F829-16A8-DE36-30D38B2C592C}"/>
+            </a:ext>
+          </a:extLst>
+        </p:cNvPr>
+        <p:cNvGrpSpPr/>
+        <p:nvPr/>
+      </p:nvGrpSpPr>
+      <p:grpSpPr>
+        <a:xfrm>
+          <a:off x="0" y="0"/>
+          <a:ext cx="0" cy="0"/>
+          <a:chOff x="0" y="0"/>
+          <a:chExt cx="0" cy="0"/>
+        </a:xfrm>
+      </p:grpSpPr>
+      <p:sp>
+        <p:nvSpPr>
+          <p:cNvPr id="27" name="Rounded Rectangle 26">
+            <a:extLst>
+              <a:ext uri="{FF2B5EF4-FFF2-40B4-BE49-F238E27FC236}">
+                <a16:creationId xmlns:a16="http://schemas.microsoft.com/office/drawing/2014/main" id="{DDC702C1-B968-2088-0A35-05BE62A4AB16}"/>
+              </a:ext>
+            </a:extLst>
+          </p:cNvPr>
+          <p:cNvSpPr/>
+          <p:nvPr/>
+        </p:nvSpPr>
+        <p:spPr>
+          <a:xfrm>
+            <a:off x="853570" y="853671"/>
+            <a:ext cx="7234527" cy="4851352"/>
+          </a:xfrm>
+          <a:prstGeom prst="roundRect">
+            <a:avLst>
+              <a:gd name="adj" fmla="val 4437"/>
+            </a:avLst>
+          </a:prstGeom>
+          <a:solidFill>
+            <a:srgbClr val="EDEDED"/>
+          </a:solidFill>
+          <a:ln>
+            <a:solidFill>
+              <a:srgbClr val="000000"/>
+            </a:solidFill>
+          </a:ln>
+          <a:effectLst/>
+        </p:spPr>
+        <p:style>
+          <a:lnRef idx="1">
+            <a:schemeClr val="accent1"/>
+          </a:lnRef>
+          <a:fillRef idx="3">
+            <a:schemeClr val="accent1"/>
+          </a:fillRef>
+          <a:effectRef idx="2">
+            <a:schemeClr val="accent1"/>
+          </a:effectRef>
+          <a:fontRef idx="minor">
+            <a:schemeClr val="lt1"/>
+          </a:fontRef>
+        </p:style>
+        <p:txBody>
+          <a:bodyPr rtlCol="0" anchor="ctr"/>
+          <a:lstStyle/>
+          <a:p>
+            <a:pPr algn="ctr"/>
+            <a:endParaRPr lang="en-US"/>
+          </a:p>
+        </p:txBody>
+      </p:sp>
+      <p:sp>
+        <p:nvSpPr>
+          <p:cNvPr id="26" name="Rectangle 25">
+            <a:extLst>
+              <a:ext uri="{FF2B5EF4-FFF2-40B4-BE49-F238E27FC236}">
+                <a16:creationId xmlns:a16="http://schemas.microsoft.com/office/drawing/2014/main" id="{75F32538-E297-F27D-4C34-8DF19A9E86DA}"/>
+              </a:ext>
+            </a:extLst>
+          </p:cNvPr>
+          <p:cNvSpPr/>
+          <p:nvPr/>
+        </p:nvSpPr>
+        <p:spPr>
+          <a:xfrm>
+            <a:off x="863980" y="855015"/>
+            <a:ext cx="7213708" cy="923330"/>
+          </a:xfrm>
+          <a:prstGeom prst="rect">
+            <a:avLst/>
+          </a:prstGeom>
+        </p:spPr>
+        <p:txBody>
+          <a:bodyPr wrap="square">
+            <a:spAutoFit/>
+          </a:bodyPr>
+          <a:lstStyle/>
+          <a:p>
+            <a:pPr algn="ctr"/>
+            <a:r>
+              <a:rPr lang="en-US" sz="5400" b="1" dirty="0">
+                <a:solidFill>
+                  <a:srgbClr val="052B48"/>
+                </a:solidFill>
+                <a:latin typeface="Calibri"/>
+                <a:cs typeface="Calibri"/>
+              </a:rPr>
+              <a:t>Editing NWB Files</a:t>
+            </a:r>
+          </a:p>
+        </p:txBody>
+      </p:sp>
+      <p:grpSp>
+        <p:nvGrpSpPr>
+          <p:cNvPr id="6" name="Group 5">
+            <a:extLst>
+              <a:ext uri="{FF2B5EF4-FFF2-40B4-BE49-F238E27FC236}">
+                <a16:creationId xmlns:a16="http://schemas.microsoft.com/office/drawing/2014/main" id="{AB6CEBCC-5012-9E82-1008-30A6A9F8337C}"/>
+              </a:ext>
+            </a:extLst>
+          </p:cNvPr>
+          <p:cNvGrpSpPr>
+            <a:grpSpLocks noChangeAspect="1"/>
+          </p:cNvGrpSpPr>
+          <p:nvPr/>
+        </p:nvGrpSpPr>
+        <p:grpSpPr>
+          <a:xfrm>
+            <a:off x="2028333" y="2352489"/>
+            <a:ext cx="3041388" cy="3108960"/>
+            <a:chOff x="1544285" y="1840138"/>
+            <a:chExt cx="3619836" cy="3700266"/>
+          </a:xfrm>
+        </p:grpSpPr>
+        <p:sp>
+          <p:nvSpPr>
+            <p:cNvPr id="13" name="Folded Corner 12">
+              <a:extLst>
+                <a:ext uri="{FF2B5EF4-FFF2-40B4-BE49-F238E27FC236}">
+                  <a16:creationId xmlns:a16="http://schemas.microsoft.com/office/drawing/2014/main" id="{1AA6F527-6B5E-0947-F843-9ABE9D805519}"/>
+                </a:ext>
+              </a:extLst>
+            </p:cNvPr>
+            <p:cNvSpPr/>
+            <p:nvPr/>
+          </p:nvSpPr>
+          <p:spPr>
+            <a:xfrm rot="10800000" flipH="1">
+              <a:off x="2674222" y="2150156"/>
+              <a:ext cx="2489899" cy="3390248"/>
+            </a:xfrm>
+            <a:prstGeom prst="foldedCorner">
+              <a:avLst>
+                <a:gd name="adj" fmla="val 26556"/>
+              </a:avLst>
+            </a:prstGeom>
+            <a:solidFill>
+              <a:srgbClr val="052A48"/>
+            </a:solidFill>
+            <a:ln w="38100" cmpd="sng">
+              <a:solidFill>
+                <a:schemeClr val="bg1"/>
+              </a:solidFill>
+            </a:ln>
+            <a:effectLst/>
+          </p:spPr>
+          <p:style>
+            <a:lnRef idx="1">
+              <a:schemeClr val="accent1"/>
+            </a:lnRef>
+            <a:fillRef idx="3">
+              <a:schemeClr val="accent1"/>
+            </a:fillRef>
+            <a:effectRef idx="2">
+              <a:schemeClr val="accent1"/>
+            </a:effectRef>
+            <a:fontRef idx="minor">
+              <a:schemeClr val="lt1"/>
+            </a:fontRef>
+          </p:style>
+          <p:txBody>
+            <a:bodyPr rtlCol="0" anchor="ctr"/>
+            <a:lstStyle/>
+            <a:p>
+              <a:pPr algn="ctr"/>
+              <a:r>
+                <a:rPr lang="en-US" sz="2400" u="sng" dirty="0"/>
+                <a:t>													   </a:t>
+              </a:r>
+            </a:p>
+          </p:txBody>
+        </p:sp>
+        <p:sp>
+          <p:nvSpPr>
+            <p:cNvPr id="15" name="Oval 14">
+              <a:extLst>
+                <a:ext uri="{FF2B5EF4-FFF2-40B4-BE49-F238E27FC236}">
+                  <a16:creationId xmlns:a16="http://schemas.microsoft.com/office/drawing/2014/main" id="{740143B2-BB0C-0AE3-4738-29C3BB794E87}"/>
+                </a:ext>
+              </a:extLst>
+            </p:cNvPr>
+            <p:cNvSpPr/>
+            <p:nvPr/>
+          </p:nvSpPr>
+          <p:spPr>
+            <a:xfrm>
+              <a:off x="1544285" y="1840138"/>
+              <a:ext cx="2478024" cy="2481818"/>
+            </a:xfrm>
+            <a:prstGeom prst="ellipse">
+              <a:avLst/>
+            </a:prstGeom>
+            <a:solidFill>
+              <a:schemeClr val="bg1"/>
+            </a:solidFill>
+            <a:ln w="76200" cmpd="sng">
+              <a:solidFill>
+                <a:srgbClr val="052A48"/>
+              </a:solidFill>
+            </a:ln>
+            <a:effectLst/>
+          </p:spPr>
+          <p:style>
+            <a:lnRef idx="1">
+              <a:schemeClr val="accent1"/>
+            </a:lnRef>
+            <a:fillRef idx="3">
+              <a:schemeClr val="accent1"/>
+            </a:fillRef>
+            <a:effectRef idx="2">
+              <a:schemeClr val="accent1"/>
+            </a:effectRef>
+            <a:fontRef idx="minor">
+              <a:schemeClr val="lt1"/>
+            </a:fontRef>
+          </p:style>
+          <p:txBody>
+            <a:bodyPr rtlCol="0" anchor="ctr"/>
+            <a:lstStyle/>
+            <a:p>
+              <a:endParaRPr lang="en-US" sz="4400" dirty="0"/>
+            </a:p>
+          </p:txBody>
+        </p:sp>
+        <p:pic>
+          <p:nvPicPr>
+            <p:cNvPr id="3" name="Picture 2" descr="logo_brain_transp_512x512.png">
+              <a:extLst>
+                <a:ext uri="{FF2B5EF4-FFF2-40B4-BE49-F238E27FC236}">
+                  <a16:creationId xmlns:a16="http://schemas.microsoft.com/office/drawing/2014/main" id="{1A6E1437-9359-F989-5151-DCE381CD806F}"/>
+                </a:ext>
+              </a:extLst>
+            </p:cNvPr>
+            <p:cNvPicPr>
+              <a:picLocks noChangeAspect="1"/>
+            </p:cNvPicPr>
+            <p:nvPr/>
+          </p:nvPicPr>
+          <p:blipFill>
+            <a:blip r:embed="rId2">
+              <a:extLst>
+                <a:ext uri="{28A0092B-C50C-407E-A947-70E740481C1C}">
+                  <a14:useLocalDpi xmlns:a14="http://schemas.microsoft.com/office/drawing/2010/main" val="0"/>
+                </a:ext>
+              </a:extLst>
+            </a:blip>
+            <a:stretch>
+              <a:fillRect/>
+            </a:stretch>
+          </p:blipFill>
+          <p:spPr>
+            <a:xfrm>
+              <a:off x="1776922" y="2065594"/>
+              <a:ext cx="2154717" cy="2154717"/>
+            </a:xfrm>
+            <a:prstGeom prst="rect">
+              <a:avLst/>
+            </a:prstGeom>
+          </p:spPr>
+        </p:pic>
+      </p:grpSp>
+      <p:pic>
+        <p:nvPicPr>
+          <p:cNvPr id="4" name="Graphic 3" descr="Pencil with solid fill">
+            <a:extLst>
+              <a:ext uri="{FF2B5EF4-FFF2-40B4-BE49-F238E27FC236}">
+                <a16:creationId xmlns:a16="http://schemas.microsoft.com/office/drawing/2014/main" id="{3C84114A-AF21-7215-1148-AC96120C76D7}"/>
+              </a:ext>
+            </a:extLst>
+          </p:cNvPr>
+          <p:cNvPicPr>
+            <a:picLocks noChangeAspect="1"/>
+          </p:cNvPicPr>
+          <p:nvPr/>
+        </p:nvPicPr>
+        <p:blipFill>
+          <a:blip r:embed="rId3">
+            <a:extLst>
+              <a:ext uri="{96DAC541-7B7A-43D3-8B79-37D633B846F1}">
+                <asvg:svgBlip xmlns:asvg="http://schemas.microsoft.com/office/drawing/2016/SVG/main" r:embed="rId4"/>
+              </a:ext>
+            </a:extLst>
+          </a:blip>
+          <a:stretch>
+            <a:fillRect/>
+          </a:stretch>
+        </p:blipFill>
+        <p:spPr>
+          <a:xfrm>
+            <a:off x="4337912" y="1655673"/>
+            <a:ext cx="3062632" cy="3062632"/>
+          </a:xfrm>
+          <a:prstGeom prst="rect">
+            <a:avLst/>
+          </a:prstGeom>
+        </p:spPr>
+      </p:pic>
+    </p:spTree>
+    <p:extLst>
+      <p:ext uri="{BB962C8B-B14F-4D97-AF65-F5344CB8AC3E}">
+        <p14:creationId xmlns:p14="http://schemas.microsoft.com/office/powerpoint/2010/main" val="1828938515"/>
+      </p:ext>
+    </p:extLst>
+  </p:cSld>
+  <p:clrMapOvr>
+    <a:masterClrMapping/>
+  </p:clrMapOvr>
+</p:sld>
+</file>
+
 <file path=ppt/slides/slide2.xml><?xml version="1.0" encoding="utf-8"?>
 <p:sld xmlns:a="http://schemas.openxmlformats.org/drawingml/2006/main" xmlns:r="http://schemas.openxmlformats.org/officeDocument/2006/relationships" xmlns:p="http://schemas.openxmlformats.org/presentationml/2006/main">
   <p:cSld>
@@ -8756,6 +9228,214 @@
     <p:extLst>
       <p:ext uri="{BB962C8B-B14F-4D97-AF65-F5344CB8AC3E}">
         <p14:creationId xmlns:p14="http://schemas.microsoft.com/office/powerpoint/2010/main" val="1093748511"/>
+      </p:ext>
+    </p:extLst>
+  </p:cSld>
+  <p:clrMapOvr>
+    <a:masterClrMapping/>
+  </p:clrMapOvr>
+</p:sld>
+</file>
+
+<file path=ppt/slides/slide20.xml><?xml version="1.0" encoding="utf-8"?>
+<p:sld xmlns:a="http://schemas.openxmlformats.org/drawingml/2006/main" xmlns:r="http://schemas.openxmlformats.org/officeDocument/2006/relationships" xmlns:p="http://schemas.openxmlformats.org/presentationml/2006/main">
+  <p:cSld>
+    <p:spTree>
+      <p:nvGrpSpPr>
+        <p:cNvPr id="1" name="">
+          <a:extLst>
+            <a:ext uri="{FF2B5EF4-FFF2-40B4-BE49-F238E27FC236}">
+              <a16:creationId xmlns:a16="http://schemas.microsoft.com/office/drawing/2014/main" id="{71E4B4A6-73B7-86C7-8670-46D8D41DD2E0}"/>
+            </a:ext>
+          </a:extLst>
+        </p:cNvPr>
+        <p:cNvGrpSpPr/>
+        <p:nvPr/>
+      </p:nvGrpSpPr>
+      <p:grpSpPr>
+        <a:xfrm>
+          <a:off x="0" y="0"/>
+          <a:ext cx="0" cy="0"/>
+          <a:chOff x="0" y="0"/>
+          <a:chExt cx="0" cy="0"/>
+        </a:xfrm>
+      </p:grpSpPr>
+      <p:sp>
+        <p:nvSpPr>
+          <p:cNvPr id="27" name="Rounded Rectangle 26">
+            <a:extLst>
+              <a:ext uri="{FF2B5EF4-FFF2-40B4-BE49-F238E27FC236}">
+                <a16:creationId xmlns:a16="http://schemas.microsoft.com/office/drawing/2014/main" id="{5BC30344-1E85-01AE-B374-65D2A28A5CE4}"/>
+              </a:ext>
+            </a:extLst>
+          </p:cNvPr>
+          <p:cNvSpPr/>
+          <p:nvPr/>
+        </p:nvSpPr>
+        <p:spPr>
+          <a:xfrm>
+            <a:off x="853570" y="853671"/>
+            <a:ext cx="7234527" cy="4851352"/>
+          </a:xfrm>
+          <a:prstGeom prst="roundRect">
+            <a:avLst>
+              <a:gd name="adj" fmla="val 4437"/>
+            </a:avLst>
+          </a:prstGeom>
+          <a:solidFill>
+            <a:srgbClr val="EDEDED"/>
+          </a:solidFill>
+          <a:ln>
+            <a:solidFill>
+              <a:srgbClr val="000000"/>
+            </a:solidFill>
+          </a:ln>
+          <a:effectLst/>
+        </p:spPr>
+        <p:style>
+          <a:lnRef idx="1">
+            <a:schemeClr val="accent1"/>
+          </a:lnRef>
+          <a:fillRef idx="3">
+            <a:schemeClr val="accent1"/>
+          </a:fillRef>
+          <a:effectRef idx="2">
+            <a:schemeClr val="accent1"/>
+          </a:effectRef>
+          <a:fontRef idx="minor">
+            <a:schemeClr val="lt1"/>
+          </a:fontRef>
+        </p:style>
+        <p:txBody>
+          <a:bodyPr rtlCol="0" anchor="ctr"/>
+          <a:lstStyle/>
+          <a:p>
+            <a:pPr algn="ctr"/>
+            <a:endParaRPr lang="en-US"/>
+          </a:p>
+        </p:txBody>
+      </p:sp>
+      <p:sp>
+        <p:nvSpPr>
+          <p:cNvPr id="26" name="Rectangle 25">
+            <a:extLst>
+              <a:ext uri="{FF2B5EF4-FFF2-40B4-BE49-F238E27FC236}">
+                <a16:creationId xmlns:a16="http://schemas.microsoft.com/office/drawing/2014/main" id="{217F646C-9719-14B7-7C33-4C1EDEE3A37C}"/>
+              </a:ext>
+            </a:extLst>
+          </p:cNvPr>
+          <p:cNvSpPr/>
+          <p:nvPr/>
+        </p:nvSpPr>
+        <p:spPr>
+          <a:xfrm>
+            <a:off x="863980" y="855015"/>
+            <a:ext cx="7213708" cy="1754326"/>
+          </a:xfrm>
+          <a:prstGeom prst="rect">
+            <a:avLst/>
+          </a:prstGeom>
+        </p:spPr>
+        <p:txBody>
+          <a:bodyPr wrap="square">
+            <a:spAutoFit/>
+          </a:bodyPr>
+          <a:lstStyle/>
+          <a:p>
+            <a:pPr algn="ctr"/>
+            <a:r>
+              <a:rPr lang="en-US" sz="5400" b="1" dirty="0">
+                <a:solidFill>
+                  <a:srgbClr val="052B48"/>
+                </a:solidFill>
+                <a:latin typeface="Calibri"/>
+                <a:cs typeface="Calibri"/>
+              </a:rPr>
+              <a:t>How to Configure Term Validations</a:t>
+            </a:r>
+          </a:p>
+        </p:txBody>
+      </p:sp>
+      <p:pic>
+        <p:nvPicPr>
+          <p:cNvPr id="5" name="Picture 4" descr="A screenshot of a computer program&#10;&#10;Description automatically generated">
+            <a:extLst>
+              <a:ext uri="{FF2B5EF4-FFF2-40B4-BE49-F238E27FC236}">
+                <a16:creationId xmlns:a16="http://schemas.microsoft.com/office/drawing/2014/main" id="{2851F3E0-6DDF-3D42-6DD6-F047F89DE89D}"/>
+              </a:ext>
+            </a:extLst>
+          </p:cNvPr>
+          <p:cNvPicPr>
+            <a:picLocks noChangeAspect="1"/>
+          </p:cNvPicPr>
+          <p:nvPr/>
+        </p:nvPicPr>
+        <p:blipFill>
+          <a:blip r:embed="rId2">
+            <a:extLst>
+              <a:ext uri="{28A0092B-C50C-407E-A947-70E740481C1C}">
+                <a14:useLocalDpi xmlns:a14="http://schemas.microsoft.com/office/drawing/2010/main" val="0"/>
+              </a:ext>
+            </a:extLst>
+          </a:blip>
+          <a:srcRect b="27504"/>
+          <a:stretch/>
+        </p:blipFill>
+        <p:spPr>
+          <a:xfrm>
+            <a:off x="1092469" y="2609341"/>
+            <a:ext cx="6748024" cy="2877059"/>
+          </a:xfrm>
+          <a:prstGeom prst="rect">
+            <a:avLst/>
+          </a:prstGeom>
+        </p:spPr>
+      </p:pic>
+      <p:pic>
+        <p:nvPicPr>
+          <p:cNvPr id="8" name="Graphic 7" descr="Checkmark with solid fill">
+            <a:extLst>
+              <a:ext uri="{FF2B5EF4-FFF2-40B4-BE49-F238E27FC236}">
+                <a16:creationId xmlns:a16="http://schemas.microsoft.com/office/drawing/2014/main" id="{3F4CAD09-F09B-12DE-B61E-ABF91DBB5A75}"/>
+              </a:ext>
+            </a:extLst>
+          </p:cNvPr>
+          <p:cNvPicPr>
+            <a:picLocks noChangeAspect="1"/>
+          </p:cNvPicPr>
+          <p:nvPr/>
+        </p:nvPicPr>
+        <p:blipFill>
+          <a:blip r:embed="rId3">
+            <a:extLst>
+              <a:ext uri="{96DAC541-7B7A-43D3-8B79-37D633B846F1}">
+                <asvg:svgBlip xmlns:asvg="http://schemas.microsoft.com/office/drawing/2016/SVG/main" r:embed="rId4"/>
+              </a:ext>
+            </a:extLst>
+          </a:blip>
+          <a:stretch>
+            <a:fillRect/>
+          </a:stretch>
+        </p:blipFill>
+        <p:spPr>
+          <a:xfrm>
+            <a:off x="5828804" y="3584369"/>
+            <a:ext cx="1902031" cy="1902031"/>
+          </a:xfrm>
+          <a:prstGeom prst="rect">
+            <a:avLst/>
+          </a:prstGeom>
+          <a:effectLst>
+            <a:innerShdw blurRad="131865">
+              <a:prstClr val="black"/>
+            </a:innerShdw>
+          </a:effectLst>
+        </p:spPr>
+      </p:pic>
+    </p:spTree>
+    <p:extLst>
+      <p:ext uri="{BB962C8B-B14F-4D97-AF65-F5344CB8AC3E}">
+        <p14:creationId xmlns:p14="http://schemas.microsoft.com/office/powerpoint/2010/main" val="3570217831"/>
       </p:ext>
     </p:extLst>
   </p:cSld>

</xml_diff>